<commit_message>
day before SAP workshop update on 6/6
</commit_message>
<xml_diff>
--- a/SAP-on-Azure-Workshop-multi-day-/Presentations/Lift_and_Shift_CaseStudy.pptx
+++ b/SAP-on-Azure-Workshop-multi-day-/Presentations/Lift_and_Shift_CaseStudy.pptx
@@ -221,7 +221,7 @@
           <a:p>
             <a:fld id="{C00A4C3D-CC51-4C7B-A7B2-6DCB884C6BAD}" type="datetimeFigureOut">
               <a:rPr lang="en-US" smtClean="0"/>
-              <a:t>5/31/2016</a:t>
+              <a:t>6/6/2016</a:t>
             </a:fld>
             <a:endParaRPr lang="en-US"/>
           </a:p>
@@ -634,7 +634,7 @@
           <a:p>
             <a:fld id="{64CFA94A-519F-445C-B30C-9E76FA6A2031}" type="datetime8">
               <a:rPr lang="en-US" smtClean="0"/>
-              <a:t>5/31/2016 11:54 AM</a:t>
+              <a:t>6/6/2016 6:29 AM</a:t>
             </a:fld>
             <a:endParaRPr lang="en-US" dirty="0"/>
           </a:p>
@@ -3014,7 +3014,7 @@
           <a:p>
             <a:fld id="{B43957C8-476F-4A09-9B25-155BABA9E28B}" type="datetimeFigureOut">
               <a:rPr lang="en-US" smtClean="0"/>
-              <a:t>5/31/2016</a:t>
+              <a:t>6/6/2016</a:t>
             </a:fld>
             <a:endParaRPr lang="en-US"/>
           </a:p>
@@ -3216,7 +3216,7 @@
           <a:p>
             <a:fld id="{B43957C8-476F-4A09-9B25-155BABA9E28B}" type="datetimeFigureOut">
               <a:rPr lang="en-US" smtClean="0"/>
-              <a:t>5/31/2016</a:t>
+              <a:t>6/6/2016</a:t>
             </a:fld>
             <a:endParaRPr lang="en-US"/>
           </a:p>
@@ -3843,7 +3843,7 @@
           <a:p>
             <a:fld id="{B43957C8-476F-4A09-9B25-155BABA9E28B}" type="datetimeFigureOut">
               <a:rPr lang="en-US" smtClean="0"/>
-              <a:t>5/31/2016</a:t>
+              <a:t>6/6/2016</a:t>
             </a:fld>
             <a:endParaRPr lang="en-US"/>
           </a:p>
@@ -4112,7 +4112,7 @@
           <a:p>
             <a:fld id="{B43957C8-476F-4A09-9B25-155BABA9E28B}" type="datetimeFigureOut">
               <a:rPr lang="en-US" smtClean="0"/>
-              <a:t>5/31/2016</a:t>
+              <a:t>6/6/2016</a:t>
             </a:fld>
             <a:endParaRPr lang="en-US"/>
           </a:p>
@@ -4365,7 +4365,7 @@
           <a:p>
             <a:fld id="{B43957C8-476F-4A09-9B25-155BABA9E28B}" type="datetimeFigureOut">
               <a:rPr lang="en-US" smtClean="0"/>
-              <a:t>5/31/2016</a:t>
+              <a:t>6/6/2016</a:t>
             </a:fld>
             <a:endParaRPr lang="en-US"/>
           </a:p>
@@ -4753,7 +4753,7 @@
           <a:p>
             <a:fld id="{B43957C8-476F-4A09-9B25-155BABA9E28B}" type="datetimeFigureOut">
               <a:rPr lang="en-US" smtClean="0"/>
-              <a:t>5/31/2016</a:t>
+              <a:t>6/6/2016</a:t>
             </a:fld>
             <a:endParaRPr lang="en-US"/>
           </a:p>
@@ -4894,7 +4894,7 @@
           <a:p>
             <a:fld id="{B43957C8-476F-4A09-9B25-155BABA9E28B}" type="datetimeFigureOut">
               <a:rPr lang="en-US" smtClean="0"/>
-              <a:t>5/31/2016</a:t>
+              <a:t>6/6/2016</a:t>
             </a:fld>
             <a:endParaRPr lang="en-US"/>
           </a:p>
@@ -5013,7 +5013,7 @@
           <a:p>
             <a:fld id="{B43957C8-476F-4A09-9B25-155BABA9E28B}" type="datetimeFigureOut">
               <a:rPr lang="en-US" smtClean="0"/>
-              <a:t>5/31/2016</a:t>
+              <a:t>6/6/2016</a:t>
             </a:fld>
             <a:endParaRPr lang="en-US"/>
           </a:p>
@@ -5312,7 +5312,7 @@
           <a:p>
             <a:fld id="{B43957C8-476F-4A09-9B25-155BABA9E28B}" type="datetimeFigureOut">
               <a:rPr lang="en-US" smtClean="0"/>
-              <a:t>5/31/2016</a:t>
+              <a:t>6/6/2016</a:t>
             </a:fld>
             <a:endParaRPr lang="en-US"/>
           </a:p>
@@ -5588,7 +5588,7 @@
           <a:p>
             <a:fld id="{B43957C8-476F-4A09-9B25-155BABA9E28B}" type="datetimeFigureOut">
               <a:rPr lang="en-US" smtClean="0"/>
-              <a:t>5/31/2016</a:t>
+              <a:t>6/6/2016</a:t>
             </a:fld>
             <a:endParaRPr lang="en-US"/>
           </a:p>
@@ -5779,48 +5779,6 @@
             <a:r>
               <a:rPr lang="en-US"/>
               <a:t>Fifth level</a:t>
-            </a:r>
-          </a:p>
-        </p:txBody>
-      </p:sp>
-      <p:sp>
-        <p:nvSpPr>
-          <p:cNvPr id="13" name="TextBox 12"/>
-          <p:cNvSpPr txBox="1"/>
-          <p:nvPr userDrawn="1"/>
-        </p:nvSpPr>
-        <p:spPr>
-          <a:xfrm>
-            <a:off x="5035293" y="6410185"/>
-            <a:ext cx="2121415" cy="447815"/>
-          </a:xfrm>
-          <a:prstGeom prst="rect">
-            <a:avLst/>
-          </a:prstGeom>
-          <a:noFill/>
-        </p:spPr>
-        <p:txBody>
-          <a:bodyPr wrap="none" lIns="182880" tIns="146304" rIns="182880" bIns="146304" rtlCol="0" anchor="ctr">
-            <a:spAutoFit/>
-          </a:bodyPr>
-          <a:lstStyle/>
-          <a:p>
-            <a:pPr algn="ctr" defTabSz="932742">
-              <a:lnSpc>
-                <a:spcPct val="90000"/>
-              </a:lnSpc>
-              <a:spcAft>
-                <a:spcPts val="600"/>
-              </a:spcAft>
-            </a:pPr>
-            <a:r>
-              <a:rPr lang="en-US" sz="1100" dirty="0">
-                <a:solidFill>
-                  <a:srgbClr val="FFFFFF"/>
-                </a:solidFill>
-                <a:latin typeface="Segoe UI"/>
-              </a:rPr>
-              <a:t>MICROSOFT CONFIDENTIAL</a:t>
             </a:r>
           </a:p>
         </p:txBody>
@@ -7015,11 +6973,6 @@
               </a:rPr>
               <a:t>Present and defend your design</a:t>
             </a:r>
-            <a:endParaRPr lang="en-US" sz="2800">
-              <a:solidFill>
-                <a:schemeClr val="bg1"/>
-              </a:solidFill>
-            </a:endParaRPr>
           </a:p>
         </p:txBody>
       </p:sp>
@@ -13953,37 +13906,8 @@
                   <a:schemeClr val="bg1"/>
                 </a:solidFill>
               </a:rPr>
-              <a:t>This sample doesn’t include software </a:t>
-            </a:r>
-            <a:r>
-              <a:rPr lang="en-US">
-                <a:solidFill>
-                  <a:schemeClr val="bg1"/>
-                </a:solidFill>
-              </a:rPr>
-              <a:t>licensing (SIOS, SQL, SAP, </a:t>
-            </a:r>
-            <a:r>
-              <a:rPr lang="en-US">
-                <a:solidFill>
-                  <a:schemeClr val="bg1"/>
-                </a:solidFill>
-              </a:rPr>
-              <a:t>ASR), data egress, backup</a:t>
-            </a:r>
-            <a:r>
-              <a:rPr lang="en-US">
-                <a:solidFill>
-                  <a:schemeClr val="bg1"/>
-                </a:solidFill>
-              </a:rPr>
-              <a:t>, and DR</a:t>
-            </a:r>
-            <a:endParaRPr lang="en-US">
-              <a:solidFill>
-                <a:schemeClr val="bg1"/>
-              </a:solidFill>
-            </a:endParaRPr>
+              <a:t>This sample doesn’t include software licensing (SIOS, SQL, SAP, ASR), data egress, backup, and DR</a:t>
+            </a:r>
           </a:p>
         </p:txBody>
       </p:sp>
@@ -22683,15 +22607,7 @@
                   <a:schemeClr val="bg1"/>
                 </a:solidFill>
               </a:rPr>
-              <a:t>5</a:t>
-            </a:r>
-            <a:r>
-              <a:rPr lang="en-US" sz="2000">
-                <a:solidFill>
-                  <a:schemeClr val="bg1"/>
-                </a:solidFill>
-              </a:rPr>
-              <a:t>0 </a:t>
+              <a:t>50 </a:t>
             </a:r>
             <a:r>
               <a:rPr lang="en-US" sz="2000" dirty="0">
@@ -23908,21 +23824,6 @@
 </file>
 
 <file path=customXml/item1.xml><?xml version="1.0" encoding="utf-8"?>
-<p:properties xmlns:p="http://schemas.microsoft.com/office/2006/metadata/properties" xmlns:xsi="http://www.w3.org/2001/XMLSchema-instance" xmlns:pc="http://schemas.microsoft.com/office/infopath/2007/PartnerControls">
-  <documentManagement/>
-</p:properties>
-</file>
-
-<file path=customXml/item2.xml><?xml version="1.0" encoding="utf-8"?>
-<?mso-contentType ?>
-<FormTemplates xmlns="http://schemas.microsoft.com/sharepoint/v3/contenttype/forms">
-  <Display>DocumentLibraryForm</Display>
-  <Edit>DocumentLibraryForm</Edit>
-  <New>DocumentLibraryForm</New>
-</FormTemplates>
-</file>
-
-<file path=customXml/item3.xml><?xml version="1.0" encoding="utf-8"?>
 <ct:contentTypeSchema xmlns:ct="http://schemas.microsoft.com/office/2006/metadata/contentType" xmlns:ma="http://schemas.microsoft.com/office/2006/metadata/properties/metaAttributes" ct:_="" ma:_="" ma:contentTypeName="Document" ma:contentTypeID="0x0101007A5649F74BD2D246865E92DF86A5DAAB" ma:contentTypeVersion="2" ma:contentTypeDescription="Create a new document." ma:contentTypeScope="" ma:versionID="b9d28c9039ca96ecdb49801add257d98">
   <xsd:schema xmlns:xsd="http://www.w3.org/2001/XMLSchema" xmlns:xs="http://www.w3.org/2001/XMLSchema" xmlns:p="http://schemas.microsoft.com/office/2006/metadata/properties" xmlns:ns2="c58f79d2-8dd2-43f0-9a03-e1b9f874d667" targetNamespace="http://schemas.microsoft.com/office/2006/metadata/properties" ma:root="true" ma:fieldsID="e910adad04a1469dda5243167a9f10b1" ns2:_="">
     <xsd:import namespace="c58f79d2-8dd2-43f0-9a03-e1b9f874d667"/>
@@ -24070,31 +23971,22 @@
 </ct:contentTypeSchema>
 </file>
 
-<file path=customXml/itemProps1.xml><?xml version="1.0" encoding="utf-8"?>
-<ds:datastoreItem xmlns:ds="http://schemas.openxmlformats.org/officeDocument/2006/customXml" ds:itemID="{6D0AEEA2-3FF0-4574-ADD6-138A16464064}">
-  <ds:schemaRefs>
-    <ds:schemaRef ds:uri="http://purl.org/dc/terms/"/>
-    <ds:schemaRef ds:uri="http://schemas.openxmlformats.org/package/2006/metadata/core-properties"/>
-    <ds:schemaRef ds:uri="http://schemas.microsoft.com/office/2006/documentManagement/types"/>
-    <ds:schemaRef ds:uri="c58f79d2-8dd2-43f0-9a03-e1b9f874d667"/>
-    <ds:schemaRef ds:uri="http://purl.org/dc/elements/1.1/"/>
-    <ds:schemaRef ds:uri="http://schemas.microsoft.com/office/2006/metadata/properties"/>
-    <ds:schemaRef ds:uri="http://schemas.microsoft.com/office/infopath/2007/PartnerControls"/>
-    <ds:schemaRef ds:uri="http://www.w3.org/XML/1998/namespace"/>
-    <ds:schemaRef ds:uri="http://purl.org/dc/dcmitype/"/>
-  </ds:schemaRefs>
-</ds:datastoreItem>
+<file path=customXml/item2.xml><?xml version="1.0" encoding="utf-8"?>
+<?mso-contentType ?>
+<FormTemplates xmlns="http://schemas.microsoft.com/sharepoint/v3/contenttype/forms">
+  <Display>DocumentLibraryForm</Display>
+  <Edit>DocumentLibraryForm</Edit>
+  <New>DocumentLibraryForm</New>
+</FormTemplates>
 </file>
 
-<file path=customXml/itemProps2.xml><?xml version="1.0" encoding="utf-8"?>
-<ds:datastoreItem xmlns:ds="http://schemas.openxmlformats.org/officeDocument/2006/customXml" ds:itemID="{985E9D23-D60E-45B4-B1B0-1C23F81FABFB}">
-  <ds:schemaRefs>
-    <ds:schemaRef ds:uri="http://schemas.microsoft.com/sharepoint/v3/contenttype/forms"/>
-  </ds:schemaRefs>
-</ds:datastoreItem>
+<file path=customXml/item3.xml><?xml version="1.0" encoding="utf-8"?>
+<p:properties xmlns:p="http://schemas.microsoft.com/office/2006/metadata/properties" xmlns:xsi="http://www.w3.org/2001/XMLSchema-instance" xmlns:pc="http://schemas.microsoft.com/office/infopath/2007/PartnerControls">
+  <documentManagement/>
+</p:properties>
 </file>
 
-<file path=customXml/itemProps3.xml><?xml version="1.0" encoding="utf-8"?>
+<file path=customXml/itemProps1.xml><?xml version="1.0" encoding="utf-8"?>
 <ds:datastoreItem xmlns:ds="http://schemas.openxmlformats.org/officeDocument/2006/customXml" ds:itemID="{A21C93D0-F99C-4667-876E-8FE2A2760880}">
   <ds:schemaRefs>
     <ds:schemaRef ds:uri="http://schemas.microsoft.com/office/2006/metadata/contentType"/>
@@ -24110,4 +24002,28 @@
     <ds:schemaRef ds:uri="http://schemas.microsoft.com/internal/obd"/>
   </ds:schemaRefs>
 </ds:datastoreItem>
+</file>
+
+<file path=customXml/itemProps2.xml><?xml version="1.0" encoding="utf-8"?>
+<ds:datastoreItem xmlns:ds="http://schemas.openxmlformats.org/officeDocument/2006/customXml" ds:itemID="{985E9D23-D60E-45B4-B1B0-1C23F81FABFB}">
+  <ds:schemaRefs>
+    <ds:schemaRef ds:uri="http://schemas.microsoft.com/sharepoint/v3/contenttype/forms"/>
+  </ds:schemaRefs>
+</ds:datastoreItem>
+</file>
+
+<file path=customXml/itemProps3.xml><?xml version="1.0" encoding="utf-8"?>
+<ds:datastoreItem xmlns:ds="http://schemas.openxmlformats.org/officeDocument/2006/customXml" ds:itemID="{6D0AEEA2-3FF0-4574-ADD6-138A16464064}">
+  <ds:schemaRefs>
+    <ds:schemaRef ds:uri="http://schemas.microsoft.com/office/2006/metadata/properties"/>
+    <ds:schemaRef ds:uri="http://purl.org/dc/terms/"/>
+    <ds:schemaRef ds:uri="http://schemas.openxmlformats.org/package/2006/metadata/core-properties"/>
+    <ds:schemaRef ds:uri="http://schemas.microsoft.com/office/2006/documentManagement/types"/>
+    <ds:schemaRef ds:uri="c58f79d2-8dd2-43f0-9a03-e1b9f874d667"/>
+    <ds:schemaRef ds:uri="http://schemas.microsoft.com/office/infopath/2007/PartnerControls"/>
+    <ds:schemaRef ds:uri="http://purl.org/dc/elements/1.1/"/>
+    <ds:schemaRef ds:uri="http://www.w3.org/XML/1998/namespace"/>
+    <ds:schemaRef ds:uri="http://purl.org/dc/dcmitype/"/>
+  </ds:schemaRefs>
+</ds:datastoreItem>
 </file>
</xml_diff>

<commit_message>
Workshop day 2 updates
</commit_message>
<xml_diff>
--- a/SAP-on-Azure-Workshop-multi-day-/Presentations/Lift_and_Shift_CaseStudy.pptx
+++ b/SAP-on-Azure-Workshop-multi-day-/Presentations/Lift_and_Shift_CaseStudy.pptx
@@ -221,7 +221,7 @@
           <a:p>
             <a:fld id="{C00A4C3D-CC51-4C7B-A7B2-6DCB884C6BAD}" type="datetimeFigureOut">
               <a:rPr lang="en-US" smtClean="0"/>
-              <a:t>6/6/2016</a:t>
+              <a:t>6/7/2016</a:t>
             </a:fld>
             <a:endParaRPr lang="en-US"/>
           </a:p>
@@ -634,7 +634,7 @@
           <a:p>
             <a:fld id="{64CFA94A-519F-445C-B30C-9E76FA6A2031}" type="datetime8">
               <a:rPr lang="en-US" smtClean="0"/>
-              <a:t>6/6/2016 6:29 AM</a:t>
+              <a:t>6/7/2016 2:27 PM</a:t>
             </a:fld>
             <a:endParaRPr lang="en-US" dirty="0"/>
           </a:p>
@@ -3014,7 +3014,7 @@
           <a:p>
             <a:fld id="{B43957C8-476F-4A09-9B25-155BABA9E28B}" type="datetimeFigureOut">
               <a:rPr lang="en-US" smtClean="0"/>
-              <a:t>6/6/2016</a:t>
+              <a:t>6/7/2016</a:t>
             </a:fld>
             <a:endParaRPr lang="en-US"/>
           </a:p>
@@ -3216,7 +3216,7 @@
           <a:p>
             <a:fld id="{B43957C8-476F-4A09-9B25-155BABA9E28B}" type="datetimeFigureOut">
               <a:rPr lang="en-US" smtClean="0"/>
-              <a:t>6/6/2016</a:t>
+              <a:t>6/7/2016</a:t>
             </a:fld>
             <a:endParaRPr lang="en-US"/>
           </a:p>
@@ -3843,7 +3843,7 @@
           <a:p>
             <a:fld id="{B43957C8-476F-4A09-9B25-155BABA9E28B}" type="datetimeFigureOut">
               <a:rPr lang="en-US" smtClean="0"/>
-              <a:t>6/6/2016</a:t>
+              <a:t>6/7/2016</a:t>
             </a:fld>
             <a:endParaRPr lang="en-US"/>
           </a:p>
@@ -4112,7 +4112,7 @@
           <a:p>
             <a:fld id="{B43957C8-476F-4A09-9B25-155BABA9E28B}" type="datetimeFigureOut">
               <a:rPr lang="en-US" smtClean="0"/>
-              <a:t>6/6/2016</a:t>
+              <a:t>6/7/2016</a:t>
             </a:fld>
             <a:endParaRPr lang="en-US"/>
           </a:p>
@@ -4365,7 +4365,7 @@
           <a:p>
             <a:fld id="{B43957C8-476F-4A09-9B25-155BABA9E28B}" type="datetimeFigureOut">
               <a:rPr lang="en-US" smtClean="0"/>
-              <a:t>6/6/2016</a:t>
+              <a:t>6/7/2016</a:t>
             </a:fld>
             <a:endParaRPr lang="en-US"/>
           </a:p>
@@ -4753,7 +4753,7 @@
           <a:p>
             <a:fld id="{B43957C8-476F-4A09-9B25-155BABA9E28B}" type="datetimeFigureOut">
               <a:rPr lang="en-US" smtClean="0"/>
-              <a:t>6/6/2016</a:t>
+              <a:t>6/7/2016</a:t>
             </a:fld>
             <a:endParaRPr lang="en-US"/>
           </a:p>
@@ -4894,7 +4894,7 @@
           <a:p>
             <a:fld id="{B43957C8-476F-4A09-9B25-155BABA9E28B}" type="datetimeFigureOut">
               <a:rPr lang="en-US" smtClean="0"/>
-              <a:t>6/6/2016</a:t>
+              <a:t>6/7/2016</a:t>
             </a:fld>
             <a:endParaRPr lang="en-US"/>
           </a:p>
@@ -5013,7 +5013,7 @@
           <a:p>
             <a:fld id="{B43957C8-476F-4A09-9B25-155BABA9E28B}" type="datetimeFigureOut">
               <a:rPr lang="en-US" smtClean="0"/>
-              <a:t>6/6/2016</a:t>
+              <a:t>6/7/2016</a:t>
             </a:fld>
             <a:endParaRPr lang="en-US"/>
           </a:p>
@@ -5312,7 +5312,7 @@
           <a:p>
             <a:fld id="{B43957C8-476F-4A09-9B25-155BABA9E28B}" type="datetimeFigureOut">
               <a:rPr lang="en-US" smtClean="0"/>
-              <a:t>6/6/2016</a:t>
+              <a:t>6/7/2016</a:t>
             </a:fld>
             <a:endParaRPr lang="en-US"/>
           </a:p>
@@ -5588,7 +5588,7 @@
           <a:p>
             <a:fld id="{B43957C8-476F-4A09-9B25-155BABA9E28B}" type="datetimeFigureOut">
               <a:rPr lang="en-US" smtClean="0"/>
-              <a:t>6/6/2016</a:t>
+              <a:t>6/7/2016</a:t>
             </a:fld>
             <a:endParaRPr lang="en-US"/>
           </a:p>
@@ -18151,23 +18151,12 @@
           <a:lstStyle/>
           <a:p>
             <a:r>
-              <a:rPr lang="en-US" sz="6600" u="sng">
-                <a:solidFill>
-                  <a:srgbClr val="1F497D"/>
-                </a:solidFill>
-                <a:latin typeface="Calibri" panose="020F0502020204030204" pitchFamily="34" charset="0"/>
-                <a:ea typeface="SimSun" panose="02010600030101010101" pitchFamily="2" charset="-122"/>
-                <a:cs typeface="Times New Roman" panose="02020603050405020304" pitchFamily="18" charset="0"/>
+              <a:rPr lang="en-US" sz="6600" u="sng" dirty="0">
                 <a:hlinkClick r:id="rId3"/>
               </a:rPr>
-              <a:t>http://bit.ly/SAPRedmondDay2</a:t>
-            </a:r>
-            <a:endParaRPr lang="en-US" sz="6600">
-              <a:effectLst/>
-              <a:latin typeface="Calibri" panose="020F0502020204030204" pitchFamily="34" charset="0"/>
-              <a:ea typeface="SimSun" panose="02010600030101010101" pitchFamily="2" charset="-122"/>
-              <a:cs typeface="Times New Roman" panose="02020603050405020304" pitchFamily="18" charset="0"/>
-            </a:endParaRPr>
+              <a:t>http://bit.ly/sapworkshopday1</a:t>
+            </a:r>
+            <a:endParaRPr lang="en-US" sz="6600" dirty="0"/>
           </a:p>
         </p:txBody>
       </p:sp>
@@ -23824,6 +23813,21 @@
 </file>
 
 <file path=customXml/item1.xml><?xml version="1.0" encoding="utf-8"?>
+<p:properties xmlns:p="http://schemas.microsoft.com/office/2006/metadata/properties" xmlns:xsi="http://www.w3.org/2001/XMLSchema-instance" xmlns:pc="http://schemas.microsoft.com/office/infopath/2007/PartnerControls">
+  <documentManagement/>
+</p:properties>
+</file>
+
+<file path=customXml/item2.xml><?xml version="1.0" encoding="utf-8"?>
+<?mso-contentType ?>
+<FormTemplates xmlns="http://schemas.microsoft.com/sharepoint/v3/contenttype/forms">
+  <Display>DocumentLibraryForm</Display>
+  <Edit>DocumentLibraryForm</Edit>
+  <New>DocumentLibraryForm</New>
+</FormTemplates>
+</file>
+
+<file path=customXml/item3.xml><?xml version="1.0" encoding="utf-8"?>
 <ct:contentTypeSchema xmlns:ct="http://schemas.microsoft.com/office/2006/metadata/contentType" xmlns:ma="http://schemas.microsoft.com/office/2006/metadata/properties/metaAttributes" ct:_="" ma:_="" ma:contentTypeName="Document" ma:contentTypeID="0x0101007A5649F74BD2D246865E92DF86A5DAAB" ma:contentTypeVersion="2" ma:contentTypeDescription="Create a new document." ma:contentTypeScope="" ma:versionID="b9d28c9039ca96ecdb49801add257d98">
   <xsd:schema xmlns:xsd="http://www.w3.org/2001/XMLSchema" xmlns:xs="http://www.w3.org/2001/XMLSchema" xmlns:p="http://schemas.microsoft.com/office/2006/metadata/properties" xmlns:ns2="c58f79d2-8dd2-43f0-9a03-e1b9f874d667" targetNamespace="http://schemas.microsoft.com/office/2006/metadata/properties" ma:root="true" ma:fieldsID="e910adad04a1469dda5243167a9f10b1" ns2:_="">
     <xsd:import namespace="c58f79d2-8dd2-43f0-9a03-e1b9f874d667"/>
@@ -23971,22 +23975,31 @@
 </ct:contentTypeSchema>
 </file>
 
-<file path=customXml/item2.xml><?xml version="1.0" encoding="utf-8"?>
-<?mso-contentType ?>
-<FormTemplates xmlns="http://schemas.microsoft.com/sharepoint/v3/contenttype/forms">
-  <Display>DocumentLibraryForm</Display>
-  <Edit>DocumentLibraryForm</Edit>
-  <New>DocumentLibraryForm</New>
-</FormTemplates>
+<file path=customXml/itemProps1.xml><?xml version="1.0" encoding="utf-8"?>
+<ds:datastoreItem xmlns:ds="http://schemas.openxmlformats.org/officeDocument/2006/customXml" ds:itemID="{6D0AEEA2-3FF0-4574-ADD6-138A16464064}">
+  <ds:schemaRefs>
+    <ds:schemaRef ds:uri="http://schemas.microsoft.com/office/2006/documentManagement/types"/>
+    <ds:schemaRef ds:uri="c58f79d2-8dd2-43f0-9a03-e1b9f874d667"/>
+    <ds:schemaRef ds:uri="http://purl.org/dc/elements/1.1/"/>
+    <ds:schemaRef ds:uri="http://schemas.microsoft.com/office/2006/metadata/properties"/>
+    <ds:schemaRef ds:uri="http://purl.org/dc/terms/"/>
+    <ds:schemaRef ds:uri="http://schemas.openxmlformats.org/package/2006/metadata/core-properties"/>
+    <ds:schemaRef ds:uri="http://schemas.microsoft.com/office/infopath/2007/PartnerControls"/>
+    <ds:schemaRef ds:uri="http://www.w3.org/XML/1998/namespace"/>
+    <ds:schemaRef ds:uri="http://purl.org/dc/dcmitype/"/>
+  </ds:schemaRefs>
+</ds:datastoreItem>
 </file>
 
-<file path=customXml/item3.xml><?xml version="1.0" encoding="utf-8"?>
-<p:properties xmlns:p="http://schemas.microsoft.com/office/2006/metadata/properties" xmlns:xsi="http://www.w3.org/2001/XMLSchema-instance" xmlns:pc="http://schemas.microsoft.com/office/infopath/2007/PartnerControls">
-  <documentManagement/>
-</p:properties>
+<file path=customXml/itemProps2.xml><?xml version="1.0" encoding="utf-8"?>
+<ds:datastoreItem xmlns:ds="http://schemas.openxmlformats.org/officeDocument/2006/customXml" ds:itemID="{985E9D23-D60E-45B4-B1B0-1C23F81FABFB}">
+  <ds:schemaRefs>
+    <ds:schemaRef ds:uri="http://schemas.microsoft.com/sharepoint/v3/contenttype/forms"/>
+  </ds:schemaRefs>
+</ds:datastoreItem>
 </file>
 
-<file path=customXml/itemProps1.xml><?xml version="1.0" encoding="utf-8"?>
+<file path=customXml/itemProps3.xml><?xml version="1.0" encoding="utf-8"?>
 <ds:datastoreItem xmlns:ds="http://schemas.openxmlformats.org/officeDocument/2006/customXml" ds:itemID="{A21C93D0-F99C-4667-876E-8FE2A2760880}">
   <ds:schemaRefs>
     <ds:schemaRef ds:uri="http://schemas.microsoft.com/office/2006/metadata/contentType"/>
@@ -24002,28 +24015,4 @@
     <ds:schemaRef ds:uri="http://schemas.microsoft.com/internal/obd"/>
   </ds:schemaRefs>
 </ds:datastoreItem>
-</file>
-
-<file path=customXml/itemProps2.xml><?xml version="1.0" encoding="utf-8"?>
-<ds:datastoreItem xmlns:ds="http://schemas.openxmlformats.org/officeDocument/2006/customXml" ds:itemID="{985E9D23-D60E-45B4-B1B0-1C23F81FABFB}">
-  <ds:schemaRefs>
-    <ds:schemaRef ds:uri="http://schemas.microsoft.com/sharepoint/v3/contenttype/forms"/>
-  </ds:schemaRefs>
-</ds:datastoreItem>
-</file>
-
-<file path=customXml/itemProps3.xml><?xml version="1.0" encoding="utf-8"?>
-<ds:datastoreItem xmlns:ds="http://schemas.openxmlformats.org/officeDocument/2006/customXml" ds:itemID="{6D0AEEA2-3FF0-4574-ADD6-138A16464064}">
-  <ds:schemaRefs>
-    <ds:schemaRef ds:uri="http://schemas.microsoft.com/office/2006/metadata/properties"/>
-    <ds:schemaRef ds:uri="http://purl.org/dc/terms/"/>
-    <ds:schemaRef ds:uri="http://schemas.openxmlformats.org/package/2006/metadata/core-properties"/>
-    <ds:schemaRef ds:uri="http://schemas.microsoft.com/office/2006/documentManagement/types"/>
-    <ds:schemaRef ds:uri="c58f79d2-8dd2-43f0-9a03-e1b9f874d667"/>
-    <ds:schemaRef ds:uri="http://schemas.microsoft.com/office/infopath/2007/PartnerControls"/>
-    <ds:schemaRef ds:uri="http://purl.org/dc/elements/1.1/"/>
-    <ds:schemaRef ds:uri="http://www.w3.org/XML/1998/namespace"/>
-    <ds:schemaRef ds:uri="http://purl.org/dc/dcmitype/"/>
-  </ds:schemaRefs>
-</ds:datastoreItem>
 </file>
</xml_diff>